<commit_message>
Update: aliasing from single crystal reflection
</commit_message>
<xml_diff>
--- a/02-24-21_Meeting.pptx
+++ b/02-24-21_Meeting.pptx
@@ -208,7 +208,7 @@
           <a:p>
             <a:fld id="{C641FE20-8F69-4F1A-9FFA-AF460F59BF9D}" type="datetimeFigureOut">
               <a:rPr lang="zh-CN" altLang="en-US" smtClean="0"/>
-              <a:t>2021/2/25</a:t>
+              <a:t>2021/2/26</a:t>
             </a:fld>
             <a:endParaRPr lang="zh-CN" altLang="en-US"/>
           </a:p>
@@ -958,7 +958,7 @@
           <a:p>
             <a:fld id="{399438DF-2BB6-4676-A00A-A6FE608D11F6}" type="datetimeFigureOut">
               <a:rPr lang="zh-CN" altLang="en-US" smtClean="0"/>
-              <a:t>2021/2/25</a:t>
+              <a:t>2021/2/26</a:t>
             </a:fld>
             <a:endParaRPr lang="zh-CN" altLang="en-US"/>
           </a:p>
@@ -1156,7 +1156,7 @@
           <a:p>
             <a:fld id="{399438DF-2BB6-4676-A00A-A6FE608D11F6}" type="datetimeFigureOut">
               <a:rPr lang="zh-CN" altLang="en-US" smtClean="0"/>
-              <a:t>2021/2/25</a:t>
+              <a:t>2021/2/26</a:t>
             </a:fld>
             <a:endParaRPr lang="zh-CN" altLang="en-US"/>
           </a:p>
@@ -1364,7 +1364,7 @@
           <a:p>
             <a:fld id="{399438DF-2BB6-4676-A00A-A6FE608D11F6}" type="datetimeFigureOut">
               <a:rPr lang="zh-CN" altLang="en-US" smtClean="0"/>
-              <a:t>2021/2/25</a:t>
+              <a:t>2021/2/26</a:t>
             </a:fld>
             <a:endParaRPr lang="zh-CN" altLang="en-US"/>
           </a:p>
@@ -1562,7 +1562,7 @@
           <a:p>
             <a:fld id="{399438DF-2BB6-4676-A00A-A6FE608D11F6}" type="datetimeFigureOut">
               <a:rPr lang="zh-CN" altLang="en-US" smtClean="0"/>
-              <a:t>2021/2/25</a:t>
+              <a:t>2021/2/26</a:t>
             </a:fld>
             <a:endParaRPr lang="zh-CN" altLang="en-US"/>
           </a:p>
@@ -1837,7 +1837,7 @@
           <a:p>
             <a:fld id="{399438DF-2BB6-4676-A00A-A6FE608D11F6}" type="datetimeFigureOut">
               <a:rPr lang="zh-CN" altLang="en-US" smtClean="0"/>
-              <a:t>2021/2/25</a:t>
+              <a:t>2021/2/26</a:t>
             </a:fld>
             <a:endParaRPr lang="zh-CN" altLang="en-US"/>
           </a:p>
@@ -2102,7 +2102,7 @@
           <a:p>
             <a:fld id="{399438DF-2BB6-4676-A00A-A6FE608D11F6}" type="datetimeFigureOut">
               <a:rPr lang="zh-CN" altLang="en-US" smtClean="0"/>
-              <a:t>2021/2/25</a:t>
+              <a:t>2021/2/26</a:t>
             </a:fld>
             <a:endParaRPr lang="zh-CN" altLang="en-US"/>
           </a:p>
@@ -2514,7 +2514,7 @@
           <a:p>
             <a:fld id="{399438DF-2BB6-4676-A00A-A6FE608D11F6}" type="datetimeFigureOut">
               <a:rPr lang="zh-CN" altLang="en-US" smtClean="0"/>
-              <a:t>2021/2/25</a:t>
+              <a:t>2021/2/26</a:t>
             </a:fld>
             <a:endParaRPr lang="zh-CN" altLang="en-US"/>
           </a:p>
@@ -2655,7 +2655,7 @@
           <a:p>
             <a:fld id="{399438DF-2BB6-4676-A00A-A6FE608D11F6}" type="datetimeFigureOut">
               <a:rPr lang="zh-CN" altLang="en-US" smtClean="0"/>
-              <a:t>2021/2/25</a:t>
+              <a:t>2021/2/26</a:t>
             </a:fld>
             <a:endParaRPr lang="zh-CN" altLang="en-US"/>
           </a:p>
@@ -2768,7 +2768,7 @@
           <a:p>
             <a:fld id="{399438DF-2BB6-4676-A00A-A6FE608D11F6}" type="datetimeFigureOut">
               <a:rPr lang="zh-CN" altLang="en-US" smtClean="0"/>
-              <a:t>2021/2/25</a:t>
+              <a:t>2021/2/26</a:t>
             </a:fld>
             <a:endParaRPr lang="zh-CN" altLang="en-US"/>
           </a:p>
@@ -3079,7 +3079,7 @@
           <a:p>
             <a:fld id="{399438DF-2BB6-4676-A00A-A6FE608D11F6}" type="datetimeFigureOut">
               <a:rPr lang="zh-CN" altLang="en-US" smtClean="0"/>
-              <a:t>2021/2/25</a:t>
+              <a:t>2021/2/26</a:t>
             </a:fld>
             <a:endParaRPr lang="zh-CN" altLang="en-US"/>
           </a:p>
@@ -3367,7 +3367,7 @@
           <a:p>
             <a:fld id="{399438DF-2BB6-4676-A00A-A6FE608D11F6}" type="datetimeFigureOut">
               <a:rPr lang="zh-CN" altLang="en-US" smtClean="0"/>
-              <a:t>2021/2/25</a:t>
+              <a:t>2021/2/26</a:t>
             </a:fld>
             <a:endParaRPr lang="zh-CN" altLang="en-US"/>
           </a:p>
@@ -3608,7 +3608,7 @@
           <a:p>
             <a:fld id="{399438DF-2BB6-4676-A00A-A6FE608D11F6}" type="datetimeFigureOut">
               <a:rPr lang="zh-CN" altLang="en-US" smtClean="0"/>
-              <a:t>2021/2/25</a:t>
+              <a:t>2021/2/26</a:t>
             </a:fld>
             <a:endParaRPr lang="zh-CN" altLang="en-US"/>
           </a:p>
@@ -4180,7 +4180,7 @@
           <a:p>
             <a:r>
               <a:rPr lang="en-US" altLang="zh-CN" dirty="0"/>
-              <a:t>Issues</a:t>
+              <a:t>In progress</a:t>
             </a:r>
             <a:endParaRPr lang="zh-CN" altLang="en-US" dirty="0"/>
           </a:p>
@@ -4348,7 +4348,7 @@
           <a:p>
             <a:r>
               <a:rPr lang="en-US" altLang="zh-CN" dirty="0"/>
-              <a:t>Issues, output</a:t>
+              <a:t>Stretcher/compressor output</a:t>
             </a:r>
             <a:endParaRPr lang="zh-CN" altLang="en-US" dirty="0"/>
           </a:p>
@@ -4641,7 +4641,7 @@
           <a:p>
             <a:r>
               <a:rPr lang="en-US" altLang="zh-CN" dirty="0"/>
-              <a:t>Issues</a:t>
+              <a:t>In progress</a:t>
             </a:r>
           </a:p>
           <a:p>
@@ -5579,7 +5579,7 @@
                   <a:srgbClr val="FF0000"/>
                 </a:solidFill>
               </a:rPr>
-              <a:t>100fs, 9481eV, one asymmetric reflection (Si 444, 29.5 degree)</a:t>
+              <a:t>100fs, 9481eV, one asymmetric reflection (Si 444, -29.5 degree)</a:t>
             </a:r>
             <a:endParaRPr lang="zh-CN" altLang="en-US" dirty="0">
               <a:solidFill>

</xml_diff>